<commit_message>
Update images and posters
</commit_message>
<xml_diff>
--- a/Technology & Tools Used.pptx
+++ b/Technology & Tools Used.pptx
@@ -243,7 +243,7 @@
           <a:p>
             <a:fld id="{0AA88123-73AE-40D0-B4DF-30D9CCED9DDC}" type="datetimeFigureOut">
               <a:rPr lang="en-SG" smtClean="0"/>
-              <a:t>11/4/2020</a:t>
+              <a:t>12/4/2020</a:t>
             </a:fld>
             <a:endParaRPr lang="en-SG"/>
           </a:p>
@@ -413,7 +413,7 @@
           <a:p>
             <a:fld id="{0AA88123-73AE-40D0-B4DF-30D9CCED9DDC}" type="datetimeFigureOut">
               <a:rPr lang="en-SG" smtClean="0"/>
-              <a:t>11/4/2020</a:t>
+              <a:t>12/4/2020</a:t>
             </a:fld>
             <a:endParaRPr lang="en-SG"/>
           </a:p>
@@ -593,7 +593,7 @@
           <a:p>
             <a:fld id="{0AA88123-73AE-40D0-B4DF-30D9CCED9DDC}" type="datetimeFigureOut">
               <a:rPr lang="en-SG" smtClean="0"/>
-              <a:t>11/4/2020</a:t>
+              <a:t>12/4/2020</a:t>
             </a:fld>
             <a:endParaRPr lang="en-SG"/>
           </a:p>
@@ -763,7 +763,7 @@
           <a:p>
             <a:fld id="{0AA88123-73AE-40D0-B4DF-30D9CCED9DDC}" type="datetimeFigureOut">
               <a:rPr lang="en-SG" smtClean="0"/>
-              <a:t>11/4/2020</a:t>
+              <a:t>12/4/2020</a:t>
             </a:fld>
             <a:endParaRPr lang="en-SG"/>
           </a:p>
@@ -1007,7 +1007,7 @@
           <a:p>
             <a:fld id="{0AA88123-73AE-40D0-B4DF-30D9CCED9DDC}" type="datetimeFigureOut">
               <a:rPr lang="en-SG" smtClean="0"/>
-              <a:t>11/4/2020</a:t>
+              <a:t>12/4/2020</a:t>
             </a:fld>
             <a:endParaRPr lang="en-SG"/>
           </a:p>
@@ -1239,7 +1239,7 @@
           <a:p>
             <a:fld id="{0AA88123-73AE-40D0-B4DF-30D9CCED9DDC}" type="datetimeFigureOut">
               <a:rPr lang="en-SG" smtClean="0"/>
-              <a:t>11/4/2020</a:t>
+              <a:t>12/4/2020</a:t>
             </a:fld>
             <a:endParaRPr lang="en-SG"/>
           </a:p>
@@ -1606,7 +1606,7 @@
           <a:p>
             <a:fld id="{0AA88123-73AE-40D0-B4DF-30D9CCED9DDC}" type="datetimeFigureOut">
               <a:rPr lang="en-SG" smtClean="0"/>
-              <a:t>11/4/2020</a:t>
+              <a:t>12/4/2020</a:t>
             </a:fld>
             <a:endParaRPr lang="en-SG"/>
           </a:p>
@@ -1724,7 +1724,7 @@
           <a:p>
             <a:fld id="{0AA88123-73AE-40D0-B4DF-30D9CCED9DDC}" type="datetimeFigureOut">
               <a:rPr lang="en-SG" smtClean="0"/>
-              <a:t>11/4/2020</a:t>
+              <a:t>12/4/2020</a:t>
             </a:fld>
             <a:endParaRPr lang="en-SG"/>
           </a:p>
@@ -1819,7 +1819,7 @@
           <a:p>
             <a:fld id="{0AA88123-73AE-40D0-B4DF-30D9CCED9DDC}" type="datetimeFigureOut">
               <a:rPr lang="en-SG" smtClean="0"/>
-              <a:t>11/4/2020</a:t>
+              <a:t>12/4/2020</a:t>
             </a:fld>
             <a:endParaRPr lang="en-SG"/>
           </a:p>
@@ -2096,7 +2096,7 @@
           <a:p>
             <a:fld id="{0AA88123-73AE-40D0-B4DF-30D9CCED9DDC}" type="datetimeFigureOut">
               <a:rPr lang="en-SG" smtClean="0"/>
-              <a:t>11/4/2020</a:t>
+              <a:t>12/4/2020</a:t>
             </a:fld>
             <a:endParaRPr lang="en-SG"/>
           </a:p>
@@ -2353,7 +2353,7 @@
           <a:p>
             <a:fld id="{0AA88123-73AE-40D0-B4DF-30D9CCED9DDC}" type="datetimeFigureOut">
               <a:rPr lang="en-SG" smtClean="0"/>
-              <a:t>11/4/2020</a:t>
+              <a:t>12/4/2020</a:t>
             </a:fld>
             <a:endParaRPr lang="en-SG"/>
           </a:p>
@@ -2566,7 +2566,7 @@
           <a:p>
             <a:fld id="{0AA88123-73AE-40D0-B4DF-30D9CCED9DDC}" type="datetimeFigureOut">
               <a:rPr lang="en-SG" smtClean="0"/>
-              <a:t>11/4/2020</a:t>
+              <a:t>12/4/2020</a:t>
             </a:fld>
             <a:endParaRPr lang="en-SG"/>
           </a:p>
@@ -3075,7 +3075,9 @@
                     <a:lumMod val="75000"/>
                   </a:schemeClr>
                 </a:solidFill>
-                <a:latin typeface="Berlin Sans FB Demi" panose="020E0802020502020306" pitchFamily="34" charset="0"/>
+                <a:latin typeface="Futura" panose="02020800000000000000" pitchFamily="18" charset="0"/>
+                <a:ea typeface="Futura" panose="02020800000000000000" pitchFamily="18" charset="0"/>
+                <a:cs typeface="Futura" panose="02020800000000000000" pitchFamily="18" charset="0"/>
               </a:rPr>
               <a:t>AFTER DATA </a:t>
             </a:r>
@@ -3089,7 +3091,9 @@
                     <a:lumMod val="75000"/>
                   </a:schemeClr>
                 </a:solidFill>
-                <a:latin typeface="Berlin Sans FB Demi" panose="020E0802020502020306" pitchFamily="34" charset="0"/>
+                <a:latin typeface="Futura" panose="02020800000000000000" pitchFamily="18" charset="0"/>
+                <a:ea typeface="Futura" panose="02020800000000000000" pitchFamily="18" charset="0"/>
+                <a:cs typeface="Futura" panose="02020800000000000000" pitchFamily="18" charset="0"/>
               </a:rPr>
               <a:t>CRAWLING</a:t>
             </a:r>
@@ -3206,8 +3210,8 @@
         </p:nvSpPr>
         <p:spPr>
           <a:xfrm>
-            <a:off x="3151494" y="681271"/>
-            <a:ext cx="1937567" cy="400110"/>
+            <a:off x="3079576" y="619627"/>
+            <a:ext cx="2033296" cy="400110"/>
           </a:xfrm>
           <a:prstGeom prst="rect">
             <a:avLst/>
@@ -3227,8 +3231,9 @@
                     <a:lumMod val="75000"/>
                   </a:schemeClr>
                 </a:solidFill>
-                <a:latin typeface="Berlin Sans FB Demi" panose="020E0802020502020306" pitchFamily="34" charset="0"/>
-                <a:cs typeface="Gotham Medium" pitchFamily="50" charset="0"/>
+                <a:latin typeface="Futura" panose="02020800000000000000" pitchFamily="18" charset="0"/>
+                <a:ea typeface="Futura" panose="02020800000000000000" pitchFamily="18" charset="0"/>
+                <a:cs typeface="Futura" panose="02020800000000000000" pitchFamily="18" charset="0"/>
               </a:rPr>
               <a:t>IMPORT DATA</a:t>
             </a:r>
@@ -3403,8 +3408,9 @@
                     <a:lumMod val="75000"/>
                   </a:schemeClr>
                 </a:solidFill>
-                <a:latin typeface="Berlin Sans FB Demi" panose="020E0802020502020306" pitchFamily="34" charset="0"/>
-                <a:cs typeface="Gotham Medium" pitchFamily="50" charset="0"/>
+                <a:latin typeface="Futura" panose="02020800000000000000" pitchFamily="18" charset="0"/>
+                <a:ea typeface="Futura" panose="02020800000000000000" pitchFamily="18" charset="0"/>
+                <a:cs typeface="Futura" panose="02020800000000000000" pitchFamily="18" charset="0"/>
               </a:rPr>
               <a:t>DATA AGGREGATION</a:t>
             </a:r>
@@ -4777,7 +4783,7 @@
         </p:blipFill>
         <p:spPr>
           <a:xfrm>
-            <a:off x="10502413" y="11482534"/>
+            <a:off x="10502413" y="11537952"/>
             <a:ext cx="2776447" cy="1029136"/>
           </a:xfrm>
           <a:prstGeom prst="rect">
@@ -4813,7 +4819,7 @@
         </p:blipFill>
         <p:spPr>
           <a:xfrm>
-            <a:off x="10908655" y="10447955"/>
+            <a:off x="10908655" y="10503373"/>
             <a:ext cx="1018419" cy="1176996"/>
           </a:xfrm>
           <a:prstGeom prst="rect">
@@ -4849,7 +4855,7 @@
         </p:blipFill>
         <p:spPr>
           <a:xfrm>
-            <a:off x="11927074" y="10483194"/>
+            <a:off x="11927074" y="10538612"/>
             <a:ext cx="1012781" cy="1141757"/>
           </a:xfrm>
           <a:prstGeom prst="rect">
@@ -4957,7 +4963,7 @@
         </p:blipFill>
         <p:spPr>
           <a:xfrm>
-            <a:off x="6015547" y="11929554"/>
+            <a:off x="6662170" y="12007716"/>
             <a:ext cx="1252387" cy="1209933"/>
           </a:xfrm>
           <a:prstGeom prst="rect">
@@ -5029,7 +5035,7 @@
         </p:blipFill>
         <p:spPr>
           <a:xfrm>
-            <a:off x="7327619" y="11832563"/>
+            <a:off x="7974242" y="11910725"/>
             <a:ext cx="1037318" cy="1202218"/>
           </a:xfrm>
           <a:prstGeom prst="rect">
@@ -5065,7 +5071,7 @@
         </p:blipFill>
         <p:spPr>
           <a:xfrm>
-            <a:off x="8364937" y="11832563"/>
+            <a:off x="2187148" y="11859642"/>
             <a:ext cx="1016112" cy="1176996"/>
           </a:xfrm>
           <a:prstGeom prst="rect">
@@ -5087,7 +5093,7 @@
         </p:nvSpPr>
         <p:spPr>
           <a:xfrm>
-            <a:off x="5030701" y="12209376"/>
+            <a:off x="5677324" y="12287538"/>
             <a:ext cx="1362389" cy="461665"/>
           </a:xfrm>
           <a:prstGeom prst="rect">
@@ -5136,7 +5142,7 @@
         </p:blipFill>
         <p:spPr>
           <a:xfrm>
-            <a:off x="1658246" y="11144104"/>
+            <a:off x="1658246" y="10977850"/>
             <a:ext cx="1036958" cy="1197066"/>
           </a:xfrm>
           <a:prstGeom prst="rect">
@@ -5172,7 +5178,7 @@
         </p:blipFill>
         <p:spPr>
           <a:xfrm>
-            <a:off x="2687869" y="11131900"/>
+            <a:off x="2687869" y="10965646"/>
             <a:ext cx="1032745" cy="1197065"/>
           </a:xfrm>
           <a:prstGeom prst="rect">
@@ -5208,7 +5214,7 @@
         </p:blipFill>
         <p:spPr>
           <a:xfrm>
-            <a:off x="10773020" y="12417031"/>
+            <a:off x="10773020" y="12472449"/>
             <a:ext cx="2168421" cy="761463"/>
           </a:xfrm>
           <a:prstGeom prst="rect">

</xml_diff>